<commit_message>
edit materi part 34
</commit_message>
<xml_diff>
--- a/dunia ilkom/PPT/PART 34 Operator Logika dalam Pascal.pptx
+++ b/dunia ilkom/PPT/PART 34 Operator Logika dalam Pascal.pptx
@@ -9,9 +9,15 @@
     <p:sldId id="257" r:id="rId3"/>
     <p:sldId id="258" r:id="rId4"/>
     <p:sldId id="259" r:id="rId5"/>
-    <p:sldId id="260" r:id="rId6"/>
-    <p:sldId id="261" r:id="rId7"/>
-    <p:sldId id="262" r:id="rId8"/>
+    <p:sldId id="263" r:id="rId6"/>
+    <p:sldId id="264" r:id="rId7"/>
+    <p:sldId id="265" r:id="rId8"/>
+    <p:sldId id="266" r:id="rId9"/>
+    <p:sldId id="267" r:id="rId10"/>
+    <p:sldId id="268" r:id="rId11"/>
+    <p:sldId id="260" r:id="rId12"/>
+    <p:sldId id="261" r:id="rId13"/>
+    <p:sldId id="262" r:id="rId14"/>
   </p:sldIdLst>
   <p:sldSz cx="12192000" cy="6858000"/>
   <p:notesSz cx="6858000" cy="9144000"/>
@@ -3652,6 +3658,446 @@
 </p:sld>
 </file>
 
+<file path=ppt/slides/slide10.xml><?xml version="1.0" encoding="utf-8"?>
+<p:sld xmlns:a="http://schemas.openxmlformats.org/drawingml/2006/main" xmlns:r="http://schemas.openxmlformats.org/officeDocument/2006/relationships" xmlns:p="http://schemas.openxmlformats.org/presentationml/2006/main">
+  <p:cSld>
+    <p:spTree>
+      <p:nvGrpSpPr>
+        <p:cNvPr id="1" name=""/>
+        <p:cNvGrpSpPr/>
+        <p:nvPr/>
+      </p:nvGrpSpPr>
+      <p:grpSpPr>
+        <a:xfrm>
+          <a:off x="0" y="0"/>
+          <a:ext cx="0" cy="0"/>
+          <a:chOff x="0" y="0"/>
+          <a:chExt cx="0" cy="0"/>
+        </a:xfrm>
+      </p:grpSpPr>
+      <p:sp>
+        <p:nvSpPr>
+          <p:cNvPr id="2" name="Title 1">
+            <a:extLst>
+              <a:ext uri="{FF2B5EF4-FFF2-40B4-BE49-F238E27FC236}">
+                <a16:creationId xmlns:a16="http://schemas.microsoft.com/office/drawing/2014/main" id="{42ABCF28-2C02-42A2-8CD3-29108666966E}"/>
+              </a:ext>
+            </a:extLst>
+          </p:cNvPr>
+          <p:cNvSpPr>
+            <a:spLocks noGrp="1"/>
+          </p:cNvSpPr>
+          <p:nvPr>
+            <p:ph type="title"/>
+          </p:nvPr>
+        </p:nvSpPr>
+        <p:spPr/>
+        <p:txBody>
+          <a:bodyPr/>
+          <a:lstStyle/>
+          <a:p>
+            <a:endParaRPr lang="en-US"/>
+          </a:p>
+        </p:txBody>
+      </p:sp>
+      <p:sp>
+        <p:nvSpPr>
+          <p:cNvPr id="3" name="Content Placeholder 2">
+            <a:extLst>
+              <a:ext uri="{FF2B5EF4-FFF2-40B4-BE49-F238E27FC236}">
+                <a16:creationId xmlns:a16="http://schemas.microsoft.com/office/drawing/2014/main" id="{96FCBD15-2DC3-4985-B396-944E6DE7F7AB}"/>
+              </a:ext>
+            </a:extLst>
+          </p:cNvPr>
+          <p:cNvSpPr>
+            <a:spLocks noGrp="1"/>
+          </p:cNvSpPr>
+          <p:nvPr>
+            <p:ph idx="1"/>
+          </p:nvPr>
+        </p:nvSpPr>
+        <p:spPr/>
+        <p:txBody>
+          <a:bodyPr/>
+          <a:lstStyle/>
+          <a:p>
+            <a:endParaRPr lang="en-US"/>
+          </a:p>
+        </p:txBody>
+      </p:sp>
+      <p:pic>
+        <p:nvPicPr>
+          <p:cNvPr id="5" name="Picture 4">
+            <a:extLst>
+              <a:ext uri="{FF2B5EF4-FFF2-40B4-BE49-F238E27FC236}">
+                <a16:creationId xmlns:a16="http://schemas.microsoft.com/office/drawing/2014/main" id="{D8A84D46-9C87-4F03-B942-9D96212E1E1E}"/>
+              </a:ext>
+            </a:extLst>
+          </p:cNvPr>
+          <p:cNvPicPr>
+            <a:picLocks noChangeAspect="1"/>
+          </p:cNvPicPr>
+          <p:nvPr/>
+        </p:nvPicPr>
+        <p:blipFill>
+          <a:blip r:embed="rId2"/>
+          <a:stretch>
+            <a:fillRect/>
+          </a:stretch>
+        </p:blipFill>
+        <p:spPr>
+          <a:xfrm>
+            <a:off x="2442721" y="2179505"/>
+            <a:ext cx="7620989" cy="2774632"/>
+          </a:xfrm>
+          <a:prstGeom prst="rect">
+            <a:avLst/>
+          </a:prstGeom>
+        </p:spPr>
+      </p:pic>
+    </p:spTree>
+    <p:extLst>
+      <p:ext uri="{BB962C8B-B14F-4D97-AF65-F5344CB8AC3E}">
+        <p14:creationId xmlns:p14="http://schemas.microsoft.com/office/powerpoint/2010/main" val="2039695701"/>
+      </p:ext>
+    </p:extLst>
+  </p:cSld>
+  <p:clrMapOvr>
+    <a:masterClrMapping/>
+  </p:clrMapOvr>
+</p:sld>
+</file>
+
+<file path=ppt/slides/slide11.xml><?xml version="1.0" encoding="utf-8"?>
+<p:sld xmlns:a="http://schemas.openxmlformats.org/drawingml/2006/main" xmlns:r="http://schemas.openxmlformats.org/officeDocument/2006/relationships" xmlns:p="http://schemas.openxmlformats.org/presentationml/2006/main">
+  <p:cSld>
+    <p:spTree>
+      <p:nvGrpSpPr>
+        <p:cNvPr id="1" name=""/>
+        <p:cNvGrpSpPr/>
+        <p:nvPr/>
+      </p:nvGrpSpPr>
+      <p:grpSpPr>
+        <a:xfrm>
+          <a:off x="0" y="0"/>
+          <a:ext cx="0" cy="0"/>
+          <a:chOff x="0" y="0"/>
+          <a:chExt cx="0" cy="0"/>
+        </a:xfrm>
+      </p:grpSpPr>
+      <p:sp>
+        <p:nvSpPr>
+          <p:cNvPr id="2" name="Title 1">
+            <a:extLst>
+              <a:ext uri="{FF2B5EF4-FFF2-40B4-BE49-F238E27FC236}">
+                <a16:creationId xmlns:a16="http://schemas.microsoft.com/office/drawing/2014/main" id="{2A7FE5A2-F62F-4A6C-A65D-B34E9E268570}"/>
+              </a:ext>
+            </a:extLst>
+          </p:cNvPr>
+          <p:cNvSpPr>
+            <a:spLocks noGrp="1"/>
+          </p:cNvSpPr>
+          <p:nvPr>
+            <p:ph type="title"/>
+          </p:nvPr>
+        </p:nvSpPr>
+        <p:spPr/>
+        <p:txBody>
+          <a:bodyPr/>
+          <a:lstStyle/>
+          <a:p>
+            <a:endParaRPr lang="id-ID"/>
+          </a:p>
+        </p:txBody>
+      </p:sp>
+      <p:sp>
+        <p:nvSpPr>
+          <p:cNvPr id="3" name="Content Placeholder 2">
+            <a:extLst>
+              <a:ext uri="{FF2B5EF4-FFF2-40B4-BE49-F238E27FC236}">
+                <a16:creationId xmlns:a16="http://schemas.microsoft.com/office/drawing/2014/main" id="{BD8601C9-B310-4C57-A300-E45A0B915C71}"/>
+              </a:ext>
+            </a:extLst>
+          </p:cNvPr>
+          <p:cNvSpPr>
+            <a:spLocks noGrp="1"/>
+          </p:cNvSpPr>
+          <p:nvPr>
+            <p:ph idx="1"/>
+          </p:nvPr>
+        </p:nvSpPr>
+        <p:spPr/>
+        <p:txBody>
+          <a:bodyPr/>
+          <a:lstStyle/>
+          <a:p>
+            <a:endParaRPr lang="id-ID"/>
+          </a:p>
+        </p:txBody>
+      </p:sp>
+      <p:pic>
+        <p:nvPicPr>
+          <p:cNvPr id="7" name="Picture 6">
+            <a:extLst>
+              <a:ext uri="{FF2B5EF4-FFF2-40B4-BE49-F238E27FC236}">
+                <a16:creationId xmlns:a16="http://schemas.microsoft.com/office/drawing/2014/main" id="{8B615C58-029E-49E2-8CBA-8C9F2447A6B7}"/>
+              </a:ext>
+            </a:extLst>
+          </p:cNvPr>
+          <p:cNvPicPr>
+            <a:picLocks noChangeAspect="1"/>
+          </p:cNvPicPr>
+          <p:nvPr/>
+        </p:nvPicPr>
+        <p:blipFill>
+          <a:blip r:embed="rId2"/>
+          <a:stretch>
+            <a:fillRect/>
+          </a:stretch>
+        </p:blipFill>
+        <p:spPr>
+          <a:xfrm>
+            <a:off x="2662291" y="804519"/>
+            <a:ext cx="7181850" cy="5248962"/>
+          </a:xfrm>
+          <a:prstGeom prst="rect">
+            <a:avLst/>
+          </a:prstGeom>
+        </p:spPr>
+      </p:pic>
+    </p:spTree>
+    <p:extLst>
+      <p:ext uri="{BB962C8B-B14F-4D97-AF65-F5344CB8AC3E}">
+        <p14:creationId xmlns:p14="http://schemas.microsoft.com/office/powerpoint/2010/main" val="3618434465"/>
+      </p:ext>
+    </p:extLst>
+  </p:cSld>
+  <p:clrMapOvr>
+    <a:masterClrMapping/>
+  </p:clrMapOvr>
+</p:sld>
+</file>
+
+<file path=ppt/slides/slide12.xml><?xml version="1.0" encoding="utf-8"?>
+<p:sld xmlns:a="http://schemas.openxmlformats.org/drawingml/2006/main" xmlns:r="http://schemas.openxmlformats.org/officeDocument/2006/relationships" xmlns:p="http://schemas.openxmlformats.org/presentationml/2006/main">
+  <p:cSld>
+    <p:spTree>
+      <p:nvGrpSpPr>
+        <p:cNvPr id="1" name=""/>
+        <p:cNvGrpSpPr/>
+        <p:nvPr/>
+      </p:nvGrpSpPr>
+      <p:grpSpPr>
+        <a:xfrm>
+          <a:off x="0" y="0"/>
+          <a:ext cx="0" cy="0"/>
+          <a:chOff x="0" y="0"/>
+          <a:chExt cx="0" cy="0"/>
+        </a:xfrm>
+      </p:grpSpPr>
+      <p:sp>
+        <p:nvSpPr>
+          <p:cNvPr id="2" name="Title 1">
+            <a:extLst>
+              <a:ext uri="{FF2B5EF4-FFF2-40B4-BE49-F238E27FC236}">
+                <a16:creationId xmlns:a16="http://schemas.microsoft.com/office/drawing/2014/main" id="{331C7BC8-B54B-4E00-A2E1-9B6AA305A63F}"/>
+              </a:ext>
+            </a:extLst>
+          </p:cNvPr>
+          <p:cNvSpPr>
+            <a:spLocks noGrp="1"/>
+          </p:cNvSpPr>
+          <p:nvPr>
+            <p:ph type="title"/>
+          </p:nvPr>
+        </p:nvSpPr>
+        <p:spPr/>
+        <p:txBody>
+          <a:bodyPr/>
+          <a:lstStyle/>
+          <a:p>
+            <a:endParaRPr lang="id-ID"/>
+          </a:p>
+        </p:txBody>
+      </p:sp>
+      <p:sp>
+        <p:nvSpPr>
+          <p:cNvPr id="3" name="Content Placeholder 2">
+            <a:extLst>
+              <a:ext uri="{FF2B5EF4-FFF2-40B4-BE49-F238E27FC236}">
+                <a16:creationId xmlns:a16="http://schemas.microsoft.com/office/drawing/2014/main" id="{02D6DF45-1AA6-4DD8-BCCD-F857B7042D12}"/>
+              </a:ext>
+            </a:extLst>
+          </p:cNvPr>
+          <p:cNvSpPr>
+            <a:spLocks noGrp="1"/>
+          </p:cNvSpPr>
+          <p:nvPr>
+            <p:ph idx="1"/>
+          </p:nvPr>
+        </p:nvSpPr>
+        <p:spPr/>
+        <p:txBody>
+          <a:bodyPr/>
+          <a:lstStyle/>
+          <a:p>
+            <a:endParaRPr lang="id-ID"/>
+          </a:p>
+        </p:txBody>
+      </p:sp>
+      <p:pic>
+        <p:nvPicPr>
+          <p:cNvPr id="5" name="Picture 4">
+            <a:extLst>
+              <a:ext uri="{FF2B5EF4-FFF2-40B4-BE49-F238E27FC236}">
+                <a16:creationId xmlns:a16="http://schemas.microsoft.com/office/drawing/2014/main" id="{0C400B8C-ADC8-4612-95F1-C740D5AC335F}"/>
+              </a:ext>
+            </a:extLst>
+          </p:cNvPr>
+          <p:cNvPicPr>
+            <a:picLocks noChangeAspect="1"/>
+          </p:cNvPicPr>
+          <p:nvPr/>
+        </p:nvPicPr>
+        <p:blipFill>
+          <a:blip r:embed="rId2"/>
+          <a:stretch>
+            <a:fillRect/>
+          </a:stretch>
+        </p:blipFill>
+        <p:spPr>
+          <a:xfrm>
+            <a:off x="2433637" y="295275"/>
+            <a:ext cx="7324725" cy="6267450"/>
+          </a:xfrm>
+          <a:prstGeom prst="rect">
+            <a:avLst/>
+          </a:prstGeom>
+        </p:spPr>
+      </p:pic>
+    </p:spTree>
+    <p:extLst>
+      <p:ext uri="{BB962C8B-B14F-4D97-AF65-F5344CB8AC3E}">
+        <p14:creationId xmlns:p14="http://schemas.microsoft.com/office/powerpoint/2010/main" val="1244799441"/>
+      </p:ext>
+    </p:extLst>
+  </p:cSld>
+  <p:clrMapOvr>
+    <a:masterClrMapping/>
+  </p:clrMapOvr>
+</p:sld>
+</file>
+
+<file path=ppt/slides/slide13.xml><?xml version="1.0" encoding="utf-8"?>
+<p:sld xmlns:a="http://schemas.openxmlformats.org/drawingml/2006/main" xmlns:r="http://schemas.openxmlformats.org/officeDocument/2006/relationships" xmlns:p="http://schemas.openxmlformats.org/presentationml/2006/main">
+  <p:cSld>
+    <p:spTree>
+      <p:nvGrpSpPr>
+        <p:cNvPr id="1" name=""/>
+        <p:cNvGrpSpPr/>
+        <p:nvPr/>
+      </p:nvGrpSpPr>
+      <p:grpSpPr>
+        <a:xfrm>
+          <a:off x="0" y="0"/>
+          <a:ext cx="0" cy="0"/>
+          <a:chOff x="0" y="0"/>
+          <a:chExt cx="0" cy="0"/>
+        </a:xfrm>
+      </p:grpSpPr>
+      <p:sp>
+        <p:nvSpPr>
+          <p:cNvPr id="2" name="Title 1">
+            <a:extLst>
+              <a:ext uri="{FF2B5EF4-FFF2-40B4-BE49-F238E27FC236}">
+                <a16:creationId xmlns:a16="http://schemas.microsoft.com/office/drawing/2014/main" id="{24F0DFB6-6FCF-4327-911A-26D725F7207C}"/>
+              </a:ext>
+            </a:extLst>
+          </p:cNvPr>
+          <p:cNvSpPr>
+            <a:spLocks noGrp="1"/>
+          </p:cNvSpPr>
+          <p:nvPr>
+            <p:ph type="title"/>
+          </p:nvPr>
+        </p:nvSpPr>
+        <p:spPr/>
+        <p:txBody>
+          <a:bodyPr/>
+          <a:lstStyle/>
+          <a:p>
+            <a:endParaRPr lang="id-ID"/>
+          </a:p>
+        </p:txBody>
+      </p:sp>
+      <p:sp>
+        <p:nvSpPr>
+          <p:cNvPr id="3" name="Content Placeholder 2">
+            <a:extLst>
+              <a:ext uri="{FF2B5EF4-FFF2-40B4-BE49-F238E27FC236}">
+                <a16:creationId xmlns:a16="http://schemas.microsoft.com/office/drawing/2014/main" id="{59CCCCC6-3E64-4F1B-A369-B256C54BFE07}"/>
+              </a:ext>
+            </a:extLst>
+          </p:cNvPr>
+          <p:cNvSpPr>
+            <a:spLocks noGrp="1"/>
+          </p:cNvSpPr>
+          <p:nvPr>
+            <p:ph idx="1"/>
+          </p:nvPr>
+        </p:nvSpPr>
+        <p:spPr/>
+        <p:txBody>
+          <a:bodyPr/>
+          <a:lstStyle/>
+          <a:p>
+            <a:endParaRPr lang="id-ID"/>
+          </a:p>
+        </p:txBody>
+      </p:sp>
+      <p:pic>
+        <p:nvPicPr>
+          <p:cNvPr id="5" name="Picture 4">
+            <a:extLst>
+              <a:ext uri="{FF2B5EF4-FFF2-40B4-BE49-F238E27FC236}">
+                <a16:creationId xmlns:a16="http://schemas.microsoft.com/office/drawing/2014/main" id="{83F2204D-FC58-40A7-883E-82E788FB8EDE}"/>
+              </a:ext>
+            </a:extLst>
+          </p:cNvPr>
+          <p:cNvPicPr>
+            <a:picLocks noChangeAspect="1"/>
+          </p:cNvPicPr>
+          <p:nvPr/>
+        </p:nvPicPr>
+        <p:blipFill>
+          <a:blip r:embed="rId2"/>
+          <a:stretch>
+            <a:fillRect/>
+          </a:stretch>
+        </p:blipFill>
+        <p:spPr>
+          <a:xfrm>
+            <a:off x="2552700" y="2595562"/>
+            <a:ext cx="7086600" cy="1666875"/>
+          </a:xfrm>
+          <a:prstGeom prst="rect">
+            <a:avLst/>
+          </a:prstGeom>
+        </p:spPr>
+      </p:pic>
+    </p:spTree>
+    <p:extLst>
+      <p:ext uri="{BB962C8B-B14F-4D97-AF65-F5344CB8AC3E}">
+        <p14:creationId xmlns:p14="http://schemas.microsoft.com/office/powerpoint/2010/main" val="3057442136"/>
+      </p:ext>
+    </p:extLst>
+  </p:cSld>
+  <p:clrMapOvr>
+    <a:masterClrMapping/>
+  </p:clrMapOvr>
+</p:sld>
+</file>
+
 <file path=ppt/slides/slide2.xml><?xml version="1.0" encoding="utf-8"?>
 <p:sld xmlns:a="http://schemas.openxmlformats.org/drawingml/2006/main" xmlns:r="http://schemas.openxmlformats.org/officeDocument/2006/relationships" xmlns:p="http://schemas.openxmlformats.org/presentationml/2006/main">
   <p:cSld>
@@ -4063,7 +4509,7 @@
           <p:cNvPr id="2" name="Title 1">
             <a:extLst>
               <a:ext uri="{FF2B5EF4-FFF2-40B4-BE49-F238E27FC236}">
-                <a16:creationId xmlns:a16="http://schemas.microsoft.com/office/drawing/2014/main" id="{2A7FE5A2-F62F-4A6C-A65D-B34E9E268570}"/>
+                <a16:creationId xmlns:a16="http://schemas.microsoft.com/office/drawing/2014/main" id="{BB8E4A29-57CD-4074-AA7A-D39F7DF738BC}"/>
               </a:ext>
             </a:extLst>
           </p:cNvPr>
@@ -4079,16 +4525,16 @@
           <a:bodyPr/>
           <a:lstStyle/>
           <a:p>
-            <a:endParaRPr lang="id-ID"/>
-          </a:p>
-        </p:txBody>
-      </p:sp>
-      <p:sp>
-        <p:nvSpPr>
-          <p:cNvPr id="3" name="Content Placeholder 2">
+            <a:endParaRPr lang="en-US"/>
+          </a:p>
+        </p:txBody>
+      </p:sp>
+      <p:sp>
+        <p:nvSpPr>
+          <p:cNvPr id="13" name="Content Placeholder 12">
             <a:extLst>
               <a:ext uri="{FF2B5EF4-FFF2-40B4-BE49-F238E27FC236}">
-                <a16:creationId xmlns:a16="http://schemas.microsoft.com/office/drawing/2014/main" id="{BD8601C9-B310-4C57-A300-E45A0B915C71}"/>
+                <a16:creationId xmlns:a16="http://schemas.microsoft.com/office/drawing/2014/main" id="{CB316C9B-B2B7-4505-94D8-326A5F0C8221}"/>
               </a:ext>
             </a:extLst>
           </p:cNvPr>
@@ -4104,16 +4550,16 @@
           <a:bodyPr/>
           <a:lstStyle/>
           <a:p>
-            <a:endParaRPr lang="id-ID"/>
+            <a:endParaRPr lang="en-US"/>
           </a:p>
         </p:txBody>
       </p:sp>
       <p:pic>
         <p:nvPicPr>
-          <p:cNvPr id="5" name="Picture 4">
+          <p:cNvPr id="15" name="Picture 14">
             <a:extLst>
               <a:ext uri="{FF2B5EF4-FFF2-40B4-BE49-F238E27FC236}">
-                <a16:creationId xmlns:a16="http://schemas.microsoft.com/office/drawing/2014/main" id="{869FF628-62EE-4456-9A02-6C0385D05166}"/>
+                <a16:creationId xmlns:a16="http://schemas.microsoft.com/office/drawing/2014/main" id="{D824A54B-66AA-436A-B7C2-ACBFE158DC02}"/>
               </a:ext>
             </a:extLst>
           </p:cNvPr>
@@ -4130,38 +4576,8 @@
         </p:blipFill>
         <p:spPr>
           <a:xfrm>
-            <a:off x="1451579" y="776686"/>
-            <a:ext cx="6696075" cy="1104900"/>
-          </a:xfrm>
-          <a:prstGeom prst="rect">
-            <a:avLst/>
-          </a:prstGeom>
-        </p:spPr>
-      </p:pic>
-      <p:pic>
-        <p:nvPicPr>
-          <p:cNvPr id="7" name="Picture 6">
-            <a:extLst>
-              <a:ext uri="{FF2B5EF4-FFF2-40B4-BE49-F238E27FC236}">
-                <a16:creationId xmlns:a16="http://schemas.microsoft.com/office/drawing/2014/main" id="{8B615C58-029E-49E2-8CBA-8C9F2447A6B7}"/>
-              </a:ext>
-            </a:extLst>
-          </p:cNvPr>
-          <p:cNvPicPr>
-            <a:picLocks noChangeAspect="1"/>
-          </p:cNvPicPr>
-          <p:nvPr/>
-        </p:nvPicPr>
-        <p:blipFill>
-          <a:blip r:embed="rId3"/>
-          <a:stretch>
-            <a:fillRect/>
-          </a:stretch>
-        </p:blipFill>
-        <p:spPr>
-          <a:xfrm>
-            <a:off x="2936875" y="1714500"/>
-            <a:ext cx="7181850" cy="5143500"/>
+            <a:off x="1710969" y="587950"/>
+            <a:ext cx="9084493" cy="5337337"/>
           </a:xfrm>
           <a:prstGeom prst="rect">
             <a:avLst/>
@@ -4171,7 +4587,7 @@
     </p:spTree>
     <p:extLst>
       <p:ext uri="{BB962C8B-B14F-4D97-AF65-F5344CB8AC3E}">
-        <p14:creationId xmlns:p14="http://schemas.microsoft.com/office/powerpoint/2010/main" val="3618434465"/>
+        <p14:creationId xmlns:p14="http://schemas.microsoft.com/office/powerpoint/2010/main" val="17628002"/>
       </p:ext>
     </p:extLst>
   </p:cSld>
@@ -4203,7 +4619,7 @@
           <p:cNvPr id="2" name="Title 1">
             <a:extLst>
               <a:ext uri="{FF2B5EF4-FFF2-40B4-BE49-F238E27FC236}">
-                <a16:creationId xmlns:a16="http://schemas.microsoft.com/office/drawing/2014/main" id="{331C7BC8-B54B-4E00-A2E1-9B6AA305A63F}"/>
+                <a16:creationId xmlns:a16="http://schemas.microsoft.com/office/drawing/2014/main" id="{90B88A91-4A1C-42D2-BC11-C21AE6C89BC9}"/>
               </a:ext>
             </a:extLst>
           </p:cNvPr>
@@ -4219,48 +4635,25 @@
           <a:bodyPr/>
           <a:lstStyle/>
           <a:p>
-            <a:endParaRPr lang="id-ID"/>
-          </a:p>
-        </p:txBody>
-      </p:sp>
-      <p:sp>
-        <p:nvSpPr>
-          <p:cNvPr id="3" name="Content Placeholder 2">
+            <a:endParaRPr lang="en-US"/>
+          </a:p>
+        </p:txBody>
+      </p:sp>
+      <p:pic>
+        <p:nvPicPr>
+          <p:cNvPr id="5" name="Content Placeholder 4">
             <a:extLst>
               <a:ext uri="{FF2B5EF4-FFF2-40B4-BE49-F238E27FC236}">
-                <a16:creationId xmlns:a16="http://schemas.microsoft.com/office/drawing/2014/main" id="{02D6DF45-1AA6-4DD8-BCCD-F857B7042D12}"/>
-              </a:ext>
-            </a:extLst>
-          </p:cNvPr>
-          <p:cNvSpPr>
-            <a:spLocks noGrp="1"/>
-          </p:cNvSpPr>
-          <p:nvPr>
-            <p:ph idx="1"/>
-          </p:nvPr>
-        </p:nvSpPr>
-        <p:spPr/>
-        <p:txBody>
-          <a:bodyPr/>
-          <a:lstStyle/>
-          <a:p>
-            <a:endParaRPr lang="id-ID"/>
-          </a:p>
-        </p:txBody>
-      </p:sp>
-      <p:pic>
-        <p:nvPicPr>
-          <p:cNvPr id="5" name="Picture 4">
-            <a:extLst>
-              <a:ext uri="{FF2B5EF4-FFF2-40B4-BE49-F238E27FC236}">
-                <a16:creationId xmlns:a16="http://schemas.microsoft.com/office/drawing/2014/main" id="{0C400B8C-ADC8-4612-95F1-C740D5AC335F}"/>
+                <a16:creationId xmlns:a16="http://schemas.microsoft.com/office/drawing/2014/main" id="{B30EA5C4-5E73-429B-A729-CAC225B3F5C5}"/>
               </a:ext>
             </a:extLst>
           </p:cNvPr>
           <p:cNvPicPr>
-            <a:picLocks noChangeAspect="1"/>
+            <a:picLocks noGrp="1" noChangeAspect="1"/>
           </p:cNvPicPr>
-          <p:nvPr/>
+          <p:nvPr>
+            <p:ph idx="1"/>
+          </p:nvPr>
         </p:nvPicPr>
         <p:blipFill>
           <a:blip r:embed="rId2"/>
@@ -4270,18 +4663,15 @@
         </p:blipFill>
         <p:spPr>
           <a:xfrm>
-            <a:off x="2433637" y="295275"/>
-            <a:ext cx="7324725" cy="6267450"/>
-          </a:xfrm>
-          <a:prstGeom prst="rect">
-            <a:avLst/>
-          </a:prstGeom>
+            <a:off x="2033871" y="804519"/>
+            <a:ext cx="8583720" cy="5183774"/>
+          </a:xfrm>
         </p:spPr>
       </p:pic>
     </p:spTree>
     <p:extLst>
       <p:ext uri="{BB962C8B-B14F-4D97-AF65-F5344CB8AC3E}">
-        <p14:creationId xmlns:p14="http://schemas.microsoft.com/office/powerpoint/2010/main" val="1244799441"/>
+        <p14:creationId xmlns:p14="http://schemas.microsoft.com/office/powerpoint/2010/main" val="343174275"/>
       </p:ext>
     </p:extLst>
   </p:cSld>
@@ -4313,7 +4703,7 @@
           <p:cNvPr id="2" name="Title 1">
             <a:extLst>
               <a:ext uri="{FF2B5EF4-FFF2-40B4-BE49-F238E27FC236}">
-                <a16:creationId xmlns:a16="http://schemas.microsoft.com/office/drawing/2014/main" id="{24F0DFB6-6FCF-4327-911A-26D725F7207C}"/>
+                <a16:creationId xmlns:a16="http://schemas.microsoft.com/office/drawing/2014/main" id="{B56902EE-4AD7-4764-8A0B-45413BE9A01F}"/>
               </a:ext>
             </a:extLst>
           </p:cNvPr>
@@ -4329,7 +4719,7 @@
           <a:bodyPr/>
           <a:lstStyle/>
           <a:p>
-            <a:endParaRPr lang="id-ID"/>
+            <a:endParaRPr lang="en-US"/>
           </a:p>
         </p:txBody>
       </p:sp>
@@ -4338,7 +4728,7 @@
           <p:cNvPr id="3" name="Content Placeholder 2">
             <a:extLst>
               <a:ext uri="{FF2B5EF4-FFF2-40B4-BE49-F238E27FC236}">
-                <a16:creationId xmlns:a16="http://schemas.microsoft.com/office/drawing/2014/main" id="{59CCCCC6-3E64-4F1B-A369-B256C54BFE07}"/>
+                <a16:creationId xmlns:a16="http://schemas.microsoft.com/office/drawing/2014/main" id="{BF9E3F9A-D08F-4848-AC7F-1FDFF801D89E}"/>
               </a:ext>
             </a:extLst>
           </p:cNvPr>
@@ -4354,7 +4744,7 @@
           <a:bodyPr/>
           <a:lstStyle/>
           <a:p>
-            <a:endParaRPr lang="id-ID"/>
+            <a:endParaRPr lang="en-US"/>
           </a:p>
         </p:txBody>
       </p:sp>
@@ -4363,7 +4753,7 @@
           <p:cNvPr id="5" name="Picture 4">
             <a:extLst>
               <a:ext uri="{FF2B5EF4-FFF2-40B4-BE49-F238E27FC236}">
-                <a16:creationId xmlns:a16="http://schemas.microsoft.com/office/drawing/2014/main" id="{83F2204D-FC58-40A7-883E-82E788FB8EDE}"/>
+                <a16:creationId xmlns:a16="http://schemas.microsoft.com/office/drawing/2014/main" id="{9E4C9039-04E5-47EC-A801-BE9C7FA03A25}"/>
               </a:ext>
             </a:extLst>
           </p:cNvPr>
@@ -4380,8 +4770,8 @@
         </p:blipFill>
         <p:spPr>
           <a:xfrm>
-            <a:off x="2552700" y="2595562"/>
-            <a:ext cx="7086600" cy="1666875"/>
+            <a:off x="1623443" y="804519"/>
+            <a:ext cx="9603275" cy="5478158"/>
           </a:xfrm>
           <a:prstGeom prst="rect">
             <a:avLst/>
@@ -4391,7 +4781,175 @@
     </p:spTree>
     <p:extLst>
       <p:ext uri="{BB962C8B-B14F-4D97-AF65-F5344CB8AC3E}">
-        <p14:creationId xmlns:p14="http://schemas.microsoft.com/office/powerpoint/2010/main" val="3057442136"/>
+        <p14:creationId xmlns:p14="http://schemas.microsoft.com/office/powerpoint/2010/main" val="2829282681"/>
+      </p:ext>
+    </p:extLst>
+  </p:cSld>
+  <p:clrMapOvr>
+    <a:masterClrMapping/>
+  </p:clrMapOvr>
+</p:sld>
+</file>
+
+<file path=ppt/slides/slide8.xml><?xml version="1.0" encoding="utf-8"?>
+<p:sld xmlns:a="http://schemas.openxmlformats.org/drawingml/2006/main" xmlns:r="http://schemas.openxmlformats.org/officeDocument/2006/relationships" xmlns:p="http://schemas.openxmlformats.org/presentationml/2006/main">
+  <p:cSld>
+    <p:spTree>
+      <p:nvGrpSpPr>
+        <p:cNvPr id="1" name=""/>
+        <p:cNvGrpSpPr/>
+        <p:nvPr/>
+      </p:nvGrpSpPr>
+      <p:grpSpPr>
+        <a:xfrm>
+          <a:off x="0" y="0"/>
+          <a:ext cx="0" cy="0"/>
+          <a:chOff x="0" y="0"/>
+          <a:chExt cx="0" cy="0"/>
+        </a:xfrm>
+      </p:grpSpPr>
+      <p:sp>
+        <p:nvSpPr>
+          <p:cNvPr id="2" name="Title 1">
+            <a:extLst>
+              <a:ext uri="{FF2B5EF4-FFF2-40B4-BE49-F238E27FC236}">
+                <a16:creationId xmlns:a16="http://schemas.microsoft.com/office/drawing/2014/main" id="{0439F9E4-D6E1-42E9-B193-05415B6573B0}"/>
+              </a:ext>
+            </a:extLst>
+          </p:cNvPr>
+          <p:cNvSpPr>
+            <a:spLocks noGrp="1"/>
+          </p:cNvSpPr>
+          <p:nvPr>
+            <p:ph type="title"/>
+          </p:nvPr>
+        </p:nvSpPr>
+        <p:spPr/>
+        <p:txBody>
+          <a:bodyPr/>
+          <a:lstStyle/>
+          <a:p>
+            <a:endParaRPr lang="en-US"/>
+          </a:p>
+        </p:txBody>
+      </p:sp>
+      <p:pic>
+        <p:nvPicPr>
+          <p:cNvPr id="5" name="Content Placeholder 4">
+            <a:extLst>
+              <a:ext uri="{FF2B5EF4-FFF2-40B4-BE49-F238E27FC236}">
+                <a16:creationId xmlns:a16="http://schemas.microsoft.com/office/drawing/2014/main" id="{B26F9F00-A640-464A-A787-0376F071A7EF}"/>
+              </a:ext>
+            </a:extLst>
+          </p:cNvPr>
+          <p:cNvPicPr>
+            <a:picLocks noGrp="1" noChangeAspect="1"/>
+          </p:cNvPicPr>
+          <p:nvPr>
+            <p:ph idx="1"/>
+          </p:nvPr>
+        </p:nvPicPr>
+        <p:blipFill>
+          <a:blip r:embed="rId2"/>
+          <a:stretch>
+            <a:fillRect/>
+          </a:stretch>
+        </p:blipFill>
+        <p:spPr>
+          <a:xfrm>
+            <a:off x="1137146" y="1329136"/>
+            <a:ext cx="10859057" cy="4463874"/>
+          </a:xfrm>
+        </p:spPr>
+      </p:pic>
+    </p:spTree>
+    <p:extLst>
+      <p:ext uri="{BB962C8B-B14F-4D97-AF65-F5344CB8AC3E}">
+        <p14:creationId xmlns:p14="http://schemas.microsoft.com/office/powerpoint/2010/main" val="3084327711"/>
+      </p:ext>
+    </p:extLst>
+  </p:cSld>
+  <p:clrMapOvr>
+    <a:masterClrMapping/>
+  </p:clrMapOvr>
+</p:sld>
+</file>
+
+<file path=ppt/slides/slide9.xml><?xml version="1.0" encoding="utf-8"?>
+<p:sld xmlns:a="http://schemas.openxmlformats.org/drawingml/2006/main" xmlns:r="http://schemas.openxmlformats.org/officeDocument/2006/relationships" xmlns:p="http://schemas.openxmlformats.org/presentationml/2006/main">
+  <p:cSld>
+    <p:spTree>
+      <p:nvGrpSpPr>
+        <p:cNvPr id="1" name=""/>
+        <p:cNvGrpSpPr/>
+        <p:nvPr/>
+      </p:nvGrpSpPr>
+      <p:grpSpPr>
+        <a:xfrm>
+          <a:off x="0" y="0"/>
+          <a:ext cx="0" cy="0"/>
+          <a:chOff x="0" y="0"/>
+          <a:chExt cx="0" cy="0"/>
+        </a:xfrm>
+      </p:grpSpPr>
+      <p:sp>
+        <p:nvSpPr>
+          <p:cNvPr id="2" name="Title 1">
+            <a:extLst>
+              <a:ext uri="{FF2B5EF4-FFF2-40B4-BE49-F238E27FC236}">
+                <a16:creationId xmlns:a16="http://schemas.microsoft.com/office/drawing/2014/main" id="{3A740E95-E818-454E-A0C2-A02B425A0D4E}"/>
+              </a:ext>
+            </a:extLst>
+          </p:cNvPr>
+          <p:cNvSpPr>
+            <a:spLocks noGrp="1"/>
+          </p:cNvSpPr>
+          <p:nvPr>
+            <p:ph type="title"/>
+          </p:nvPr>
+        </p:nvSpPr>
+        <p:spPr/>
+        <p:txBody>
+          <a:bodyPr/>
+          <a:lstStyle/>
+          <a:p>
+            <a:endParaRPr lang="en-US"/>
+          </a:p>
+        </p:txBody>
+      </p:sp>
+      <p:pic>
+        <p:nvPicPr>
+          <p:cNvPr id="5" name="Content Placeholder 4">
+            <a:extLst>
+              <a:ext uri="{FF2B5EF4-FFF2-40B4-BE49-F238E27FC236}">
+                <a16:creationId xmlns:a16="http://schemas.microsoft.com/office/drawing/2014/main" id="{17D8755A-C262-42E7-A304-6B75DEE6053E}"/>
+              </a:ext>
+            </a:extLst>
+          </p:cNvPr>
+          <p:cNvPicPr>
+            <a:picLocks noGrp="1" noChangeAspect="1"/>
+          </p:cNvPicPr>
+          <p:nvPr>
+            <p:ph idx="1"/>
+          </p:nvPr>
+        </p:nvPicPr>
+        <p:blipFill>
+          <a:blip r:embed="rId2"/>
+          <a:stretch>
+            <a:fillRect/>
+          </a:stretch>
+        </p:blipFill>
+        <p:spPr>
+          <a:xfrm>
+            <a:off x="1137146" y="691751"/>
+            <a:ext cx="10229576" cy="4084965"/>
+          </a:xfrm>
+        </p:spPr>
+      </p:pic>
+    </p:spTree>
+    <p:extLst>
+      <p:ext uri="{BB962C8B-B14F-4D97-AF65-F5344CB8AC3E}">
+        <p14:creationId xmlns:p14="http://schemas.microsoft.com/office/powerpoint/2010/main" val="107172761"/>
       </p:ext>
     </p:extLst>
   </p:cSld>

</xml_diff>